<commit_message>
Added Porto Summer of Code logo to presentation.
</commit_message>
<xml_diff>
--- a/Resources/Documents/Apresentação.pptx
+++ b/Resources/Documents/Apresentação.pptx
@@ -248,7 +248,7 @@
           <a:p>
             <a:fld id="{D0FEC3B7-6CA5-407C-A104-1262A50EAD70}" type="datetimeFigureOut">
               <a:rPr lang="pt-PT" smtClean="0"/>
-              <a:t>12/09/2015</a:t>
+              <a:t>13/09/2015</a:t>
             </a:fld>
             <a:endParaRPr lang="pt-PT"/>
           </a:p>
@@ -418,7 +418,7 @@
           <a:p>
             <a:fld id="{D0FEC3B7-6CA5-407C-A104-1262A50EAD70}" type="datetimeFigureOut">
               <a:rPr lang="pt-PT" smtClean="0"/>
-              <a:t>12/09/2015</a:t>
+              <a:t>13/09/2015</a:t>
             </a:fld>
             <a:endParaRPr lang="pt-PT"/>
           </a:p>
@@ -598,7 +598,7 @@
           <a:p>
             <a:fld id="{D0FEC3B7-6CA5-407C-A104-1262A50EAD70}" type="datetimeFigureOut">
               <a:rPr lang="pt-PT" smtClean="0"/>
-              <a:t>12/09/2015</a:t>
+              <a:t>13/09/2015</a:t>
             </a:fld>
             <a:endParaRPr lang="pt-PT"/>
           </a:p>
@@ -768,7 +768,7 @@
           <a:p>
             <a:fld id="{D0FEC3B7-6CA5-407C-A104-1262A50EAD70}" type="datetimeFigureOut">
               <a:rPr lang="pt-PT" smtClean="0"/>
-              <a:t>12/09/2015</a:t>
+              <a:t>13/09/2015</a:t>
             </a:fld>
             <a:endParaRPr lang="pt-PT"/>
           </a:p>
@@ -1014,7 +1014,7 @@
           <a:p>
             <a:fld id="{D0FEC3B7-6CA5-407C-A104-1262A50EAD70}" type="datetimeFigureOut">
               <a:rPr lang="pt-PT" smtClean="0"/>
-              <a:t>12/09/2015</a:t>
+              <a:t>13/09/2015</a:t>
             </a:fld>
             <a:endParaRPr lang="pt-PT"/>
           </a:p>
@@ -1246,7 +1246,7 @@
           <a:p>
             <a:fld id="{D0FEC3B7-6CA5-407C-A104-1262A50EAD70}" type="datetimeFigureOut">
               <a:rPr lang="pt-PT" smtClean="0"/>
-              <a:t>12/09/2015</a:t>
+              <a:t>13/09/2015</a:t>
             </a:fld>
             <a:endParaRPr lang="pt-PT"/>
           </a:p>
@@ -1613,7 +1613,7 @@
           <a:p>
             <a:fld id="{D0FEC3B7-6CA5-407C-A104-1262A50EAD70}" type="datetimeFigureOut">
               <a:rPr lang="pt-PT" smtClean="0"/>
-              <a:t>12/09/2015</a:t>
+              <a:t>13/09/2015</a:t>
             </a:fld>
             <a:endParaRPr lang="pt-PT"/>
           </a:p>
@@ -1731,7 +1731,7 @@
           <a:p>
             <a:fld id="{D0FEC3B7-6CA5-407C-A104-1262A50EAD70}" type="datetimeFigureOut">
               <a:rPr lang="pt-PT" smtClean="0"/>
-              <a:t>12/09/2015</a:t>
+              <a:t>13/09/2015</a:t>
             </a:fld>
             <a:endParaRPr lang="pt-PT"/>
           </a:p>
@@ -1826,7 +1826,7 @@
           <a:p>
             <a:fld id="{D0FEC3B7-6CA5-407C-A104-1262A50EAD70}" type="datetimeFigureOut">
               <a:rPr lang="pt-PT" smtClean="0"/>
-              <a:t>12/09/2015</a:t>
+              <a:t>13/09/2015</a:t>
             </a:fld>
             <a:endParaRPr lang="pt-PT"/>
           </a:p>
@@ -2103,7 +2103,7 @@
           <a:p>
             <a:fld id="{D0FEC3B7-6CA5-407C-A104-1262A50EAD70}" type="datetimeFigureOut">
               <a:rPr lang="pt-PT" smtClean="0"/>
-              <a:t>12/09/2015</a:t>
+              <a:t>13/09/2015</a:t>
             </a:fld>
             <a:endParaRPr lang="pt-PT"/>
           </a:p>
@@ -2356,7 +2356,7 @@
           <a:p>
             <a:fld id="{D0FEC3B7-6CA5-407C-A104-1262A50EAD70}" type="datetimeFigureOut">
               <a:rPr lang="pt-PT" smtClean="0"/>
-              <a:t>12/09/2015</a:t>
+              <a:t>13/09/2015</a:t>
             </a:fld>
             <a:endParaRPr lang="pt-PT"/>
           </a:p>
@@ -2569,7 +2569,7 @@
           <a:p>
             <a:fld id="{D0FEC3B7-6CA5-407C-A104-1262A50EAD70}" type="datetimeFigureOut">
               <a:rPr lang="pt-PT" smtClean="0"/>
-              <a:t>12/09/2015</a:t>
+              <a:t>13/09/2015</a:t>
             </a:fld>
             <a:endParaRPr lang="pt-PT"/>
           </a:p>
@@ -3004,6 +3004,36 @@
           </a:prstGeom>
         </p:spPr>
       </p:pic>
+      <p:pic>
+        <p:nvPicPr>
+          <p:cNvPr id="4" name="Imagem 3"/>
+          <p:cNvPicPr>
+            <a:picLocks noChangeAspect="1"/>
+          </p:cNvPicPr>
+          <p:nvPr/>
+        </p:nvPicPr>
+        <p:blipFill>
+          <a:blip r:embed="rId3">
+            <a:extLst>
+              <a:ext uri="{28A0092B-C50C-407E-A947-70E740481C1C}">
+                <a14:useLocalDpi xmlns:a14="http://schemas.microsoft.com/office/drawing/2010/main" val="0"/>
+              </a:ext>
+            </a:extLst>
+          </a:blip>
+          <a:stretch>
+            <a:fillRect/>
+          </a:stretch>
+        </p:blipFill>
+        <p:spPr>
+          <a:xfrm>
+            <a:off x="4743450" y="4794421"/>
+            <a:ext cx="2705100" cy="1428750"/>
+          </a:xfrm>
+          <a:prstGeom prst="rect">
+            <a:avLst/>
+          </a:prstGeom>
+        </p:spPr>
+      </p:pic>
     </p:spTree>
     <p:extLst>
       <p:ext uri="{BB962C8B-B14F-4D97-AF65-F5344CB8AC3E}">
@@ -3135,10 +3165,6 @@
               </a:rPr>
               <a:t>Grande interação social usando aplicações móveis;</a:t>
             </a:r>
-            <a:endParaRPr lang="pt-PT" dirty="0" smtClean="0">
-              <a:latin typeface="Kozuka Gothic Pro R" panose="020B0400000000000000" pitchFamily="34" charset="-128"/>
-              <a:ea typeface="Kozuka Gothic Pro R" panose="020B0400000000000000" pitchFamily="34" charset="-128"/>
-            </a:endParaRPr>
           </a:p>
           <a:p>
             <a:pPr>
@@ -3155,10 +3181,6 @@
               </a:rPr>
               <a:t>Pontos de interesse não presentes em roteiros;</a:t>
             </a:r>
-            <a:endParaRPr lang="pt-PT" dirty="0" smtClean="0">
-              <a:latin typeface="Kozuka Gothic Pro R" panose="020B0400000000000000" pitchFamily="34" charset="-128"/>
-              <a:ea typeface="Kozuka Gothic Pro R" panose="020B0400000000000000" pitchFamily="34" charset="-128"/>
-            </a:endParaRPr>
           </a:p>
           <a:p>
             <a:pPr>
@@ -3175,10 +3197,6 @@
               </a:rPr>
               <a:t>Aplicações com sugestões não baseadas nos amigos;</a:t>
             </a:r>
-            <a:endParaRPr lang="pt-PT" dirty="0" smtClean="0">
-              <a:latin typeface="Kozuka Gothic Pro R" panose="020B0400000000000000" pitchFamily="34" charset="-128"/>
-              <a:ea typeface="Kozuka Gothic Pro R" panose="020B0400000000000000" pitchFamily="34" charset="-128"/>
-            </a:endParaRPr>
           </a:p>
           <a:p>
             <a:pPr>
@@ -3195,13 +3213,39 @@
               </a:rPr>
               <a:t>Inexistência de aplicações com caráter pessoal.</a:t>
             </a:r>
-            <a:endParaRPr lang="pt-PT" dirty="0" smtClean="0">
-              <a:latin typeface="Kozuka Gothic Pro R" panose="020B0400000000000000" pitchFamily="34" charset="-128"/>
-              <a:ea typeface="Kozuka Gothic Pro R" panose="020B0400000000000000" pitchFamily="34" charset="-128"/>
-            </a:endParaRPr>
-          </a:p>
-        </p:txBody>
-      </p:sp>
+          </a:p>
+        </p:txBody>
+      </p:sp>
+      <p:pic>
+        <p:nvPicPr>
+          <p:cNvPr id="4" name="Imagem 3"/>
+          <p:cNvPicPr>
+            <a:picLocks noChangeAspect="1"/>
+          </p:cNvPicPr>
+          <p:nvPr/>
+        </p:nvPicPr>
+        <p:blipFill>
+          <a:blip r:embed="rId3">
+            <a:extLst>
+              <a:ext uri="{28A0092B-C50C-407E-A947-70E740481C1C}">
+                <a14:useLocalDpi xmlns:a14="http://schemas.microsoft.com/office/drawing/2010/main" val="0"/>
+              </a:ext>
+            </a:extLst>
+          </a:blip>
+          <a:stretch>
+            <a:fillRect/>
+          </a:stretch>
+        </p:blipFill>
+        <p:spPr>
+          <a:xfrm>
+            <a:off x="175510" y="6027791"/>
+            <a:ext cx="1325380" cy="700025"/>
+          </a:xfrm>
+          <a:prstGeom prst="rect">
+            <a:avLst/>
+          </a:prstGeom>
+        </p:spPr>
+      </p:pic>
     </p:spTree>
     <p:extLst>
       <p:ext uri="{BB962C8B-B14F-4D97-AF65-F5344CB8AC3E}">
@@ -3312,14 +3356,7 @@
                 <a:latin typeface="Kozuka Gothic Pro R" panose="020B0400000000000000" pitchFamily="34" charset="-128"/>
                 <a:ea typeface="Kozuka Gothic Pro R" panose="020B0400000000000000" pitchFamily="34" charset="-128"/>
               </a:rPr>
-              <a:t>)Descobrir </a:t>
-            </a:r>
-            <a:r>
-              <a:rPr lang="pt-PT" dirty="0" smtClean="0">
-                <a:latin typeface="Kozuka Gothic Pro R" panose="020B0400000000000000" pitchFamily="34" charset="-128"/>
-                <a:ea typeface="Kozuka Gothic Pro R" panose="020B0400000000000000" pitchFamily="34" charset="-128"/>
-              </a:rPr>
-              <a:t>a Invicta;</a:t>
+              <a:t>)Descobrir a Invicta;</a:t>
             </a:r>
           </a:p>
           <a:p>
@@ -3367,7 +3404,7 @@
                 <a:latin typeface="Kozuka Gothic Pro R" panose="020B0400000000000000" pitchFamily="34" charset="-128"/>
                 <a:ea typeface="Kozuka Gothic Pro R" panose="020B0400000000000000" pitchFamily="34" charset="-128"/>
               </a:rPr>
-              <a:t>Dar a conhecer novos pontos de interesse baseado no </a:t>
+              <a:t>Dar a conhecer novos pontos de interesse baseado no “</a:t>
             </a:r>
             <a:r>
               <a:rPr lang="pt-PT" dirty="0" err="1" smtClean="0">
@@ -3381,7 +3418,7 @@
                 <a:latin typeface="Kozuka Gothic Pro R" panose="020B0400000000000000" pitchFamily="34" charset="-128"/>
                 <a:ea typeface="Kozuka Gothic Pro R" panose="020B0400000000000000" pitchFamily="34" charset="-128"/>
               </a:rPr>
-              <a:t>.</a:t>
+              <a:t>”.</a:t>
             </a:r>
             <a:endParaRPr lang="pt-PT" dirty="0">
               <a:latin typeface="Kozuka Gothic Pro R" panose="020B0400000000000000" pitchFamily="34" charset="-128"/>
@@ -3446,6 +3483,36 @@
           </a:p>
         </p:txBody>
       </p:sp>
+      <p:pic>
+        <p:nvPicPr>
+          <p:cNvPr id="5" name="Imagem 4"/>
+          <p:cNvPicPr>
+            <a:picLocks noChangeAspect="1"/>
+          </p:cNvPicPr>
+          <p:nvPr/>
+        </p:nvPicPr>
+        <p:blipFill>
+          <a:blip r:embed="rId3">
+            <a:extLst>
+              <a:ext uri="{28A0092B-C50C-407E-A947-70E740481C1C}">
+                <a14:useLocalDpi xmlns:a14="http://schemas.microsoft.com/office/drawing/2010/main" val="0"/>
+              </a:ext>
+            </a:extLst>
+          </a:blip>
+          <a:stretch>
+            <a:fillRect/>
+          </a:stretch>
+        </p:blipFill>
+        <p:spPr>
+          <a:xfrm>
+            <a:off x="175510" y="6027791"/>
+            <a:ext cx="1325380" cy="700025"/>
+          </a:xfrm>
+          <a:prstGeom prst="rect">
+            <a:avLst/>
+          </a:prstGeom>
+        </p:spPr>
+      </p:pic>
     </p:spTree>
     <p:extLst>
       <p:ext uri="{BB962C8B-B14F-4D97-AF65-F5344CB8AC3E}">
@@ -3886,6 +3953,36 @@
           </a:p>
         </p:txBody>
       </p:sp>
+      <p:pic>
+        <p:nvPicPr>
+          <p:cNvPr id="6" name="Imagem 5"/>
+          <p:cNvPicPr>
+            <a:picLocks noChangeAspect="1"/>
+          </p:cNvPicPr>
+          <p:nvPr/>
+        </p:nvPicPr>
+        <p:blipFill>
+          <a:blip r:embed="rId3">
+            <a:extLst>
+              <a:ext uri="{28A0092B-C50C-407E-A947-70E740481C1C}">
+                <a14:useLocalDpi xmlns:a14="http://schemas.microsoft.com/office/drawing/2010/main" val="0"/>
+              </a:ext>
+            </a:extLst>
+          </a:blip>
+          <a:stretch>
+            <a:fillRect/>
+          </a:stretch>
+        </p:blipFill>
+        <p:spPr>
+          <a:xfrm>
+            <a:off x="175510" y="6027791"/>
+            <a:ext cx="1325380" cy="700025"/>
+          </a:xfrm>
+          <a:prstGeom prst="rect">
+            <a:avLst/>
+          </a:prstGeom>
+        </p:spPr>
+      </p:pic>
     </p:spTree>
     <p:extLst>
       <p:ext uri="{BB962C8B-B14F-4D97-AF65-F5344CB8AC3E}">
@@ -4357,6 +4454,36 @@
           </a:p>
         </p:txBody>
       </p:sp>
+      <p:pic>
+        <p:nvPicPr>
+          <p:cNvPr id="7" name="Imagem 6"/>
+          <p:cNvPicPr>
+            <a:picLocks noChangeAspect="1"/>
+          </p:cNvPicPr>
+          <p:nvPr/>
+        </p:nvPicPr>
+        <p:blipFill>
+          <a:blip r:embed="rId3">
+            <a:extLst>
+              <a:ext uri="{28A0092B-C50C-407E-A947-70E740481C1C}">
+                <a14:useLocalDpi xmlns:a14="http://schemas.microsoft.com/office/drawing/2010/main" val="0"/>
+              </a:ext>
+            </a:extLst>
+          </a:blip>
+          <a:stretch>
+            <a:fillRect/>
+          </a:stretch>
+        </p:blipFill>
+        <p:spPr>
+          <a:xfrm>
+            <a:off x="175510" y="6027791"/>
+            <a:ext cx="1325380" cy="700025"/>
+          </a:xfrm>
+          <a:prstGeom prst="rect">
+            <a:avLst/>
+          </a:prstGeom>
+        </p:spPr>
+      </p:pic>
     </p:spTree>
     <p:extLst>
       <p:ext uri="{BB962C8B-B14F-4D97-AF65-F5344CB8AC3E}">
@@ -4451,26 +4578,8 @@
                 <a:latin typeface="Kozuka Gothic Pro R" panose="020B0400000000000000" pitchFamily="34" charset="-128"/>
                 <a:ea typeface="Kozuka Gothic Pro R" panose="020B0400000000000000" pitchFamily="34" charset="-128"/>
               </a:rPr>
-              <a:t>Estender para o resto das cidades de </a:t>
-            </a:r>
-            <a:r>
-              <a:rPr lang="pt-PT" dirty="0" smtClean="0">
-                <a:latin typeface="Kozuka Gothic Pro R" panose="020B0400000000000000" pitchFamily="34" charset="-128"/>
-                <a:ea typeface="Kozuka Gothic Pro R" panose="020B0400000000000000" pitchFamily="34" charset="-128"/>
-              </a:rPr>
-              <a:t>Portugal</a:t>
-            </a:r>
-            <a:r>
-              <a:rPr lang="pt-PT" dirty="0" smtClean="0">
-                <a:latin typeface="Kozuka Gothic Pro R" panose="020B0400000000000000" pitchFamily="34" charset="-128"/>
-                <a:ea typeface="Kozuka Gothic Pro R" panose="020B0400000000000000" pitchFamily="34" charset="-128"/>
-              </a:rPr>
-              <a:t>;</a:t>
-            </a:r>
-            <a:endParaRPr lang="pt-PT" dirty="0" smtClean="0">
-              <a:latin typeface="Kozuka Gothic Pro R" panose="020B0400000000000000" pitchFamily="34" charset="-128"/>
-              <a:ea typeface="Kozuka Gothic Pro R" panose="020B0400000000000000" pitchFamily="34" charset="-128"/>
-            </a:endParaRPr>
+              <a:t>Estender para o resto das cidades de Portugal;</a:t>
+            </a:r>
           </a:p>
           <a:p>
             <a:pPr>
@@ -4576,6 +4685,36 @@
           </a:p>
         </p:txBody>
       </p:sp>
+      <p:pic>
+        <p:nvPicPr>
+          <p:cNvPr id="6" name="Imagem 5"/>
+          <p:cNvPicPr>
+            <a:picLocks noChangeAspect="1"/>
+          </p:cNvPicPr>
+          <p:nvPr/>
+        </p:nvPicPr>
+        <p:blipFill>
+          <a:blip r:embed="rId3">
+            <a:extLst>
+              <a:ext uri="{28A0092B-C50C-407E-A947-70E740481C1C}">
+                <a14:useLocalDpi xmlns:a14="http://schemas.microsoft.com/office/drawing/2010/main" val="0"/>
+              </a:ext>
+            </a:extLst>
+          </a:blip>
+          <a:stretch>
+            <a:fillRect/>
+          </a:stretch>
+        </p:blipFill>
+        <p:spPr>
+          <a:xfrm>
+            <a:off x="175510" y="6027791"/>
+            <a:ext cx="1325380" cy="700025"/>
+          </a:xfrm>
+          <a:prstGeom prst="rect">
+            <a:avLst/>
+          </a:prstGeom>
+        </p:spPr>
+      </p:pic>
     </p:spTree>
     <p:extLst>
       <p:ext uri="{BB962C8B-B14F-4D97-AF65-F5344CB8AC3E}">

</xml_diff>